<commit_message>
My own example files uploaded
</commit_message>
<xml_diff>
--- a/COMP2041/week7/Week7.pptx
+++ b/COMP2041/week7/Week7.pptx
@@ -273,7 +273,7 @@
       </p15:sldGuideLst>
     </p:ext>
     <p:ext uri="GoogleSlidesCustomDataVersion2">
-      <go:slidesCustomData xmlns="" xmlns:mc="http://schemas.openxmlformats.org/markup-compatibility/2006" xmlns:mv="urn:schemas-microsoft-com:mac:vml" xmlns:c="http://schemas.openxmlformats.org/drawingml/2006/chart" xmlns:dgm="http://schemas.openxmlformats.org/drawingml/2006/diagram" xmlns:o="urn:schemas-microsoft-com:office:office" xmlns:v="urn:schemas-microsoft-com:vml" xmlns:pvml="urn:schemas-microsoft-com:office:powerpoint" xmlns:com="http://schemas.openxmlformats.org/drawingml/2006/compatibility" xmlns:p14="http://schemas.microsoft.com/office/powerpoint/2010/main" xmlns:p15="http://schemas.microsoft.com/office/powerpoint/2012/main" xmlns:ahyp="http://schemas.microsoft.com/office/drawing/2018/hyperlinkcolor" xmlns:go="http://customooxmlschemas.google.com/" r:id="rId15" roundtripDataSignature="AMtx7miLmd8pYo83dHl0DicE9aTiSSE7nA=="/>
+      <go:slidesCustomData xmlns:go="http://customooxmlschemas.google.com/" xmlns:ahyp="http://schemas.microsoft.com/office/drawing/2018/hyperlinkcolor" xmlns:p15="http://schemas.microsoft.com/office/powerpoint/2012/main" xmlns:p14="http://schemas.microsoft.com/office/powerpoint/2010/main" xmlns:com="http://schemas.openxmlformats.org/drawingml/2006/compatibility" xmlns:pvml="urn:schemas-microsoft-com:office:powerpoint" xmlns:v="urn:schemas-microsoft-com:vml" xmlns:o="urn:schemas-microsoft-com:office:office" xmlns:dgm="http://schemas.openxmlformats.org/drawingml/2006/diagram" xmlns:c="http://schemas.openxmlformats.org/drawingml/2006/chart" xmlns:mv="urn:schemas-microsoft-com:mac:vml" xmlns:mc="http://schemas.openxmlformats.org/markup-compatibility/2006" xmlns="" r:id="rId15" roundtripDataSignature="AMtx7miLmd8pYo83dHl0DicE9aTiSSE7nA=="/>
     </p:ext>
   </p:extLst>
 </p:presentation>
@@ -10846,7 +10846,7 @@
       </p:sp>
       <p:pic>
         <p:nvPicPr>
-          <p:cNvPr id="68" name="Google Shape;68;p1"/>
+          <p:cNvPr id="69" name="Google Shape;69;p1"/>
           <p:cNvPicPr preferRelativeResize="0"/>
           <p:nvPr/>
         </p:nvPicPr>
@@ -10859,35 +10859,8 @@
         </p:blipFill>
         <p:spPr>
           <a:xfrm>
-            <a:off x="4227950" y="372725"/>
-            <a:ext cx="4548975" cy="4398049"/>
-          </a:xfrm>
-          <a:prstGeom prst="rect">
-            <a:avLst/>
-          </a:prstGeom>
-          <a:noFill/>
-          <a:ln>
-            <a:noFill/>
-          </a:ln>
-        </p:spPr>
-      </p:pic>
-      <p:pic>
-        <p:nvPicPr>
-          <p:cNvPr id="69" name="Google Shape;69;p1"/>
-          <p:cNvPicPr preferRelativeResize="0"/>
-          <p:nvPr/>
-        </p:nvPicPr>
-        <p:blipFill rotWithShape="1">
-          <a:blip r:embed="rId4">
-            <a:alphaModFix/>
-          </a:blip>
-          <a:srcRect/>
-          <a:stretch/>
-        </p:blipFill>
-        <p:spPr>
-          <a:xfrm>
-            <a:off x="152400" y="2029150"/>
-            <a:ext cx="3825402" cy="2961950"/>
+            <a:off x="6633028" y="3214913"/>
+            <a:ext cx="2410259" cy="1841501"/>
           </a:xfrm>
           <a:prstGeom prst="rect">
             <a:avLst/>
@@ -11133,131 +11106,15 @@
             </a:pPr>
             <a:r>
               <a:rPr lang="en" dirty="0" smtClean="0"/>
-              <a:t>Assignment 2 released</a:t>
-            </a:r>
-            <a:endParaRPr lang="en-US" dirty="0" smtClean="0"/>
-          </a:p>
-          <a:p>
-            <a:pPr marL="0" lvl="0" indent="0" algn="l" rtl="0">
-              <a:lnSpc>
-                <a:spcPct val="115000"/>
-              </a:lnSpc>
-              <a:spcBef>
-                <a:spcPts val="0"/>
-              </a:spcBef>
-              <a:spcAft>
-                <a:spcPts val="0"/>
-              </a:spcAft>
-              <a:buSzPts val="1800"/>
-              <a:buNone/>
-            </a:pPr>
-            <a:endParaRPr dirty="0"/>
-          </a:p>
-          <a:p>
-            <a:pPr marL="457200" lvl="0" indent="-355600" algn="l" rtl="0">
-              <a:lnSpc>
-                <a:spcPct val="115000"/>
-              </a:lnSpc>
-              <a:spcBef>
-                <a:spcPts val="0"/>
-              </a:spcBef>
-              <a:spcAft>
-                <a:spcPts val="0"/>
-              </a:spcAft>
-              <a:buSzPts val="2000"/>
-              <a:buChar char="-"/>
-            </a:pPr>
-            <a:r>
-              <a:rPr lang="en" dirty="0"/>
-              <a:t>Assignment 1 due at 12PM Monday</a:t>
-            </a:r>
-            <a:endParaRPr dirty="0"/>
-          </a:p>
-          <a:p>
-            <a:pPr marL="457200" lvl="0" indent="-355600" algn="l" rtl="0">
-              <a:lnSpc>
-                <a:spcPct val="115000"/>
-              </a:lnSpc>
-              <a:spcBef>
-                <a:spcPts val="0"/>
-              </a:spcBef>
-              <a:spcAft>
-                <a:spcPts val="0"/>
-              </a:spcAft>
-              <a:buSzPts val="2000"/>
-              <a:buChar char="-"/>
-            </a:pPr>
-            <a:r>
-              <a:rPr lang="en" dirty="0"/>
-              <a:t>Late penalties apply</a:t>
-            </a:r>
-            <a:endParaRPr dirty="0"/>
-          </a:p>
-          <a:p>
-            <a:pPr marL="914400" lvl="1" indent="-355600" algn="l" rtl="0">
-              <a:lnSpc>
-                <a:spcPct val="115000"/>
-              </a:lnSpc>
-              <a:spcBef>
-                <a:spcPts val="0"/>
-              </a:spcBef>
-              <a:spcAft>
-                <a:spcPts val="0"/>
-              </a:spcAft>
-              <a:buSzPts val="2000"/>
-              <a:buChar char="-"/>
-            </a:pPr>
-            <a:r>
-              <a:rPr lang="en" sz="1800" dirty="0"/>
-              <a:t>5% per day for 5 days</a:t>
-            </a:r>
-            <a:endParaRPr sz="1800" dirty="0"/>
-          </a:p>
-          <a:p>
-            <a:pPr marL="914400" lvl="1" indent="-355600" algn="l" rtl="0">
-              <a:lnSpc>
-                <a:spcPct val="115000"/>
-              </a:lnSpc>
-              <a:spcBef>
-                <a:spcPts val="0"/>
-              </a:spcBef>
-              <a:spcAft>
-                <a:spcPts val="0"/>
-              </a:spcAft>
-              <a:buSzPts val="2000"/>
-              <a:buChar char="-"/>
-            </a:pPr>
-            <a:r>
-              <a:rPr lang="en" sz="1800" dirty="0"/>
-              <a:t>Penalty applied on </a:t>
+              <a:t>Assignment 1 D</a:t>
             </a:r>
             <a:r>
-              <a:rPr lang="en" sz="1800" b="1" dirty="0"/>
-              <a:t>received mark</a:t>
-            </a:r>
-            <a:endParaRPr sz="1800" b="1" dirty="0"/>
-          </a:p>
-          <a:p>
-            <a:pPr marL="914400" lvl="1" indent="-355600" algn="l" rtl="0">
-              <a:lnSpc>
-                <a:spcPct val="115000"/>
-              </a:lnSpc>
-              <a:spcBef>
-                <a:spcPts val="0"/>
-              </a:spcBef>
-              <a:spcAft>
-                <a:spcPts val="0"/>
-              </a:spcAft>
-              <a:buSzPts val="2000"/>
-              <a:buChar char="-"/>
-            </a:pPr>
-            <a:r>
-              <a:rPr lang="en" sz="1800" b="1" dirty="0"/>
-              <a:t>NOT MAX </a:t>
+              <a:rPr lang="en-US" dirty="0" smtClean="0"/>
+              <a:t>u</a:t>
             </a:r>
             <a:r>
-              <a:rPr lang="en" sz="1800" b="1" dirty="0" smtClean="0"/>
-              <a:t>MARK</a:t>
+              <a:rPr lang="en" dirty="0" smtClean="0"/>
+              <a:t>e Date Finished</a:t>
             </a:r>
             <a:endParaRPr lang="en" sz="1800" b="1" dirty="0"/>
           </a:p>
@@ -11278,8 +11135,8 @@
         </p:blipFill>
         <p:spPr>
           <a:xfrm>
-            <a:off x="5425950" y="2074364"/>
-            <a:ext cx="3451026" cy="2948386"/>
+            <a:off x="7351486" y="3599542"/>
+            <a:ext cx="1525490" cy="1423207"/>
           </a:xfrm>
           <a:prstGeom prst="rect">
             <a:avLst/>
@@ -11408,10 +11265,9 @@
               <a:buChar char="-"/>
             </a:pPr>
             <a:r>
-              <a:rPr lang="en" sz="2200"/>
-              <a:t>Python</a:t>
+              <a:rPr lang="en" sz="2200" dirty="0" smtClean="0"/>
+              <a:t>Python-specific code</a:t>
             </a:r>
-            <a:endParaRPr sz="2200"/>
           </a:p>
           <a:p>
             <a:pPr marL="457200" lvl="0" indent="-368300" algn="l" rtl="0">
@@ -11428,10 +11284,10 @@
               <a:buChar char="-"/>
             </a:pPr>
             <a:r>
-              <a:rPr lang="en" sz="2200"/>
-              <a:t>Python Interpreter (REPL)</a:t>
+              <a:rPr lang="en" sz="2200" dirty="0" smtClean="0"/>
+              <a:t>In-built Python data structures</a:t>
             </a:r>
-            <a:endParaRPr sz="2200"/>
+            <a:endParaRPr lang="en" sz="2200" dirty="0" smtClean="0"/>
           </a:p>
           <a:p>
             <a:pPr marL="457200" lvl="0" indent="-368300" algn="l" rtl="0">
@@ -11448,10 +11304,14 @@
               <a:buChar char="-"/>
             </a:pPr>
             <a:r>
-              <a:rPr lang="en" sz="2200"/>
-              <a:t>Python re module</a:t>
+              <a:rPr lang="en" sz="2200" dirty="0" smtClean="0"/>
+              <a:t>Python </a:t>
             </a:r>
-            <a:endParaRPr sz="2200"/>
+            <a:r>
+              <a:rPr lang="en" sz="2200" dirty="0"/>
+              <a:t>re module</a:t>
+            </a:r>
+            <a:endParaRPr sz="2200" dirty="0"/>
           </a:p>
         </p:txBody>
       </p:sp>
@@ -11470,8 +11330,8 @@
         </p:blipFill>
         <p:spPr>
           <a:xfrm>
-            <a:off x="4851774" y="166537"/>
-            <a:ext cx="3842225" cy="4810425"/>
+            <a:off x="7126514" y="3142343"/>
+            <a:ext cx="1567485" cy="1834619"/>
           </a:xfrm>
           <a:prstGeom prst="rect">
             <a:avLst/>
@@ -11803,8 +11663,8 @@
         </p:blipFill>
         <p:spPr bwMode="auto">
           <a:xfrm>
-            <a:off x="4435956" y="166680"/>
-            <a:ext cx="4488894" cy="2743434"/>
+            <a:off x="6960972" y="3751943"/>
+            <a:ext cx="2101763" cy="1284514"/>
           </a:xfrm>
           <a:prstGeom prst="rect">
             <a:avLst/>
@@ -12112,8 +11972,8 @@
         </p:blipFill>
         <p:spPr bwMode="auto">
           <a:xfrm>
-            <a:off x="5118932" y="2088811"/>
-            <a:ext cx="3805918" cy="2854440"/>
+            <a:off x="6988097" y="3505199"/>
+            <a:ext cx="2052865" cy="1539650"/>
           </a:xfrm>
           <a:prstGeom prst="rect">
             <a:avLst/>
@@ -12362,47 +12222,6 @@
       </p:sp>
       <p:pic>
         <p:nvPicPr>
-          <p:cNvPr id="3074" name="Picture 2" descr="Regex Validation😂😂 | Programming humor, Computer humor, Programming"/>
-          <p:cNvPicPr>
-            <a:picLocks noChangeAspect="1" noChangeArrowheads="1"/>
-          </p:cNvPicPr>
-          <p:nvPr/>
-        </p:nvPicPr>
-        <p:blipFill>
-          <a:blip r:embed="rId3">
-            <a:extLst>
-              <a:ext uri="{28A0092B-C50C-407E-A947-70E740481C1C}">
-                <a14:useLocalDpi xmlns:a14="http://schemas.microsoft.com/office/drawing/2010/main" val="0"/>
-              </a:ext>
-            </a:extLst>
-          </a:blip>
-          <a:srcRect/>
-          <a:stretch>
-            <a:fillRect/>
-          </a:stretch>
-        </p:blipFill>
-        <p:spPr bwMode="auto">
-          <a:xfrm>
-            <a:off x="6073950" y="1792701"/>
-            <a:ext cx="2850900" cy="3001967"/>
-          </a:xfrm>
-          <a:prstGeom prst="rect">
-            <a:avLst/>
-          </a:prstGeom>
-          <a:noFill/>
-          <a:extLst>
-            <a:ext uri="{909E8E84-426E-40DD-AFC4-6F175D3DCCD1}">
-              <a14:hiddenFill xmlns:a14="http://schemas.microsoft.com/office/drawing/2010/main">
-                <a:solidFill>
-                  <a:srgbClr val="FFFFFF"/>
-                </a:solidFill>
-              </a14:hiddenFill>
-            </a:ext>
-          </a:extLst>
-        </p:spPr>
-      </p:pic>
-      <p:pic>
-        <p:nvPicPr>
           <p:cNvPr id="2" name="Picture 1"/>
           <p:cNvPicPr>
             <a:picLocks noChangeAspect="1"/>
@@ -12410,15 +12229,15 @@
           <p:nvPr/>
         </p:nvPicPr>
         <p:blipFill>
-          <a:blip r:embed="rId4"/>
+          <a:blip r:embed="rId3"/>
           <a:stretch>
             <a:fillRect/>
           </a:stretch>
         </p:blipFill>
         <p:spPr>
           <a:xfrm>
-            <a:off x="2481943" y="722317"/>
-            <a:ext cx="3577771" cy="4017230"/>
+            <a:off x="7097486" y="2500481"/>
+            <a:ext cx="1981200" cy="2224552"/>
           </a:xfrm>
           <a:prstGeom prst="rect">
             <a:avLst/>
@@ -12520,8 +12339,8 @@
         </p:blipFill>
         <p:spPr>
           <a:xfrm>
-            <a:off x="1801713" y="971775"/>
-            <a:ext cx="5540575" cy="4040375"/>
+            <a:off x="3324609" y="2249715"/>
+            <a:ext cx="2204231" cy="1775464"/>
           </a:xfrm>
           <a:prstGeom prst="rect">
             <a:avLst/>
@@ -12627,33 +12446,6 @@
           </a:p>
         </p:txBody>
       </p:sp>
-      <p:pic>
-        <p:nvPicPr>
-          <p:cNvPr id="95" name="Google Shape;95;g11521c5d060_1_98"/>
-          <p:cNvPicPr preferRelativeResize="0"/>
-          <p:nvPr/>
-        </p:nvPicPr>
-        <p:blipFill rotWithShape="1">
-          <a:blip r:embed="rId3">
-            <a:alphaModFix/>
-          </a:blip>
-          <a:srcRect/>
-          <a:stretch/>
-        </p:blipFill>
-        <p:spPr>
-          <a:xfrm>
-            <a:off x="3813100" y="268638"/>
-            <a:ext cx="4606226" cy="4606226"/>
-          </a:xfrm>
-          <a:prstGeom prst="rect">
-            <a:avLst/>
-          </a:prstGeom>
-          <a:noFill/>
-          <a:ln>
-            <a:noFill/>
-          </a:ln>
-        </p:spPr>
-      </p:pic>
     </p:spTree>
   </p:cSld>
   <p:clrMapOvr>

</xml_diff>